<commit_message>
finish knot swipe, update M7 deck
</commit_message>
<xml_diff>
--- a/Slides/M7 Deployment.pptx
+++ b/Slides/M7 Deployment.pptx
@@ -6,10 +6,10 @@
     <p:sldMasterId id="2147483674" r:id="rId5"/>
   </p:sldMasterIdLst>
   <p:notesMasterIdLst>
-    <p:notesMasterId r:id="rId25"/>
+    <p:notesMasterId r:id="rId27"/>
   </p:notesMasterIdLst>
   <p:handoutMasterIdLst>
-    <p:handoutMasterId r:id="rId26"/>
+    <p:handoutMasterId r:id="rId28"/>
   </p:handoutMasterIdLst>
   <p:sldIdLst>
     <p:sldId id="459" r:id="rId6"/>
@@ -29,8 +29,10 @@
     <p:sldId id="469" r:id="rId20"/>
     <p:sldId id="470" r:id="rId21"/>
     <p:sldId id="416" r:id="rId22"/>
-    <p:sldId id="458" r:id="rId23"/>
-    <p:sldId id="269" r:id="rId24"/>
+    <p:sldId id="472" r:id="rId23"/>
+    <p:sldId id="473" r:id="rId24"/>
+    <p:sldId id="458" r:id="rId25"/>
+    <p:sldId id="269" r:id="rId26"/>
   </p:sldIdLst>
   <p:sldSz cx="12192000" cy="6858000"/>
   <p:notesSz cx="6858000" cy="9144000"/>
@@ -155,6 +157,8 @@
             <p14:sldId id="469"/>
             <p14:sldId id="470"/>
             <p14:sldId id="416"/>
+            <p14:sldId id="472"/>
+            <p14:sldId id="473"/>
             <p14:sldId id="458"/>
           </p14:sldIdLst>
         </p14:section>
@@ -259,7 +263,6 @@
             <c:showLeaderLines val="0"/>
             <c:extLst>
               <c:ext xmlns:c15="http://schemas.microsoft.com/office/drawing/2012/chart" uri="{CE6537A1-D6FC-4f65-9D91-7224C49458BB}">
-                <c15:layout/>
                 <c15:showLeaderLines val="1"/>
                 <c15:leaderLines>
                   <c:spPr>
@@ -354,11 +357,11 @@
         </c:dLbls>
         <c:gapWidth val="219"/>
         <c:overlap val="-27"/>
-        <c:axId val="298998968"/>
-        <c:axId val="298997400"/>
+        <c:axId val="191586384"/>
+        <c:axId val="191587168"/>
       </c:barChart>
       <c:catAx>
-        <c:axId val="298998968"/>
+        <c:axId val="191586384"/>
         <c:scaling>
           <c:orientation val="minMax"/>
         </c:scaling>
@@ -401,7 +404,7 @@
             <a:endParaRPr lang="en-US"/>
           </a:p>
         </c:txPr>
-        <c:crossAx val="298997400"/>
+        <c:crossAx val="191587168"/>
         <c:crosses val="autoZero"/>
         <c:auto val="1"/>
         <c:lblAlgn val="ctr"/>
@@ -409,7 +412,7 @@
         <c:noMultiLvlLbl val="0"/>
       </c:catAx>
       <c:valAx>
-        <c:axId val="298997400"/>
+        <c:axId val="191587168"/>
         <c:scaling>
           <c:orientation val="minMax"/>
         </c:scaling>
@@ -460,7 +463,7 @@
             <a:endParaRPr lang="en-US"/>
           </a:p>
         </c:txPr>
-        <c:crossAx val="298998968"/>
+        <c:crossAx val="191586384"/>
         <c:crosses val="autoZero"/>
         <c:crossBetween val="between"/>
       </c:valAx>
@@ -1124,7 +1127,7 @@
           <a:p>
             <a:fld id="{312E7B4A-039C-48A2-9B2C-AF16AA3873D8}" type="datetimeFigureOut">
               <a:rPr lang="en-US" smtClean="0"/>
-              <a:t>10/21/2014</a:t>
+              <a:t>10/22/2014</a:t>
             </a:fld>
             <a:endParaRPr lang="en-US"/>
           </a:p>
@@ -1289,7 +1292,7 @@
           <a:p>
             <a:fld id="{DA005A0C-54D9-45AA-87D4-C551D08DFCE1}" type="datetimeFigureOut">
               <a:rPr lang="en-US" smtClean="0"/>
-              <a:t>10/21/2014</a:t>
+              <a:t>10/22/2014</a:t>
             </a:fld>
             <a:endParaRPr lang="en-US"/>
           </a:p>
@@ -1840,7 +1843,7 @@
             <a:fld id="{13F0F35F-DD44-4607-AEC1-49D7A4BC4066}" type="slidenum">
               <a:rPr lang="en-US" smtClean="0"/>
               <a:pPr/>
-              <a:t>18</a:t>
+              <a:t>20</a:t>
             </a:fld>
             <a:endParaRPr lang="en-US" dirty="0"/>
           </a:p>
@@ -15136,11 +15139,11 @@
   <p:clrMapOvr>
     <a:masterClrMapping/>
   </p:clrMapOvr>
-  <mc:AlternateContent xmlns:mc="http://schemas.openxmlformats.org/markup-compatibility/2006">
-    <mc:Choice xmlns:p14="http://schemas.microsoft.com/office/powerpoint/2010/main" Requires="p14">
+  <mc:AlternateContent xmlns:mc="http://schemas.openxmlformats.org/markup-compatibility/2006" xmlns:p14="http://schemas.microsoft.com/office/powerpoint/2010/main">
+    <mc:Choice Requires="p14">
       <p:transition spd="slow" p14:dur="2000"/>
     </mc:Choice>
-    <mc:Fallback>
+    <mc:Fallback xmlns="">
       <p:transition spd="slow"/>
     </mc:Fallback>
   </mc:AlternateContent>
@@ -15510,11 +15513,7 @@
           <a:p>
             <a:r>
               <a:rPr lang="en-US" dirty="0" smtClean="0"/>
-              <a:t>Email </a:t>
-            </a:r>
-            <a:r>
-              <a:rPr lang="en-US" dirty="0" smtClean="0"/>
-              <a:t>the product team</a:t>
+              <a:t>Email the product team</a:t>
             </a:r>
             <a:r>
               <a:rPr lang="en-US" dirty="0"/>
@@ -15648,39 +15647,7 @@
       </p:grpSpPr>
       <p:sp>
         <p:nvSpPr>
-          <p:cNvPr id="7" name="Content Placeholder 6"/>
-          <p:cNvSpPr>
-            <a:spLocks noGrp="1"/>
-          </p:cNvSpPr>
-          <p:nvPr>
-            <p:ph sz="quarter" idx="10"/>
-          </p:nvPr>
-        </p:nvSpPr>
-        <p:spPr/>
-        <p:txBody>
-          <a:bodyPr>
-            <a:normAutofit/>
-          </a:bodyPr>
-          <a:lstStyle/>
-          <a:p>
-            <a:r>
-              <a:rPr lang="en-GB" dirty="0" smtClean="0"/>
-              <a:t>Multi-device hybrid apps tooling</a:t>
-            </a:r>
-            <a:endParaRPr lang="en-GB" dirty="0" smtClean="0"/>
-          </a:p>
-          <a:p>
-            <a:r>
-              <a:rPr lang="en-GB" dirty="0" smtClean="0"/>
-              <a:t>Deploying to Azure</a:t>
-            </a:r>
-            <a:endParaRPr lang="en-GB" dirty="0"/>
-          </a:p>
-        </p:txBody>
-      </p:sp>
-      <p:sp>
-        <p:nvSpPr>
-          <p:cNvPr id="2" name="Title 1"/>
+          <p:cNvPr id="4" name="Title 3"/>
           <p:cNvSpPr>
             <a:spLocks noGrp="1"/>
           </p:cNvSpPr>
@@ -15695,7 +15662,42 @@
           <a:p>
             <a:r>
               <a:rPr lang="en-US" dirty="0" smtClean="0"/>
-              <a:t>Summary</a:t>
+              <a:t>Three Deployment Methods</a:t>
+            </a:r>
+            <a:endParaRPr lang="en-US" dirty="0"/>
+          </a:p>
+        </p:txBody>
+      </p:sp>
+      <p:sp>
+        <p:nvSpPr>
+          <p:cNvPr id="5" name="Content Placeholder 4"/>
+          <p:cNvSpPr>
+            <a:spLocks noGrp="1"/>
+          </p:cNvSpPr>
+          <p:nvPr>
+            <p:ph sz="quarter" idx="10"/>
+          </p:nvPr>
+        </p:nvSpPr>
+        <p:spPr/>
+        <p:txBody>
+          <a:bodyPr/>
+          <a:lstStyle/>
+          <a:p>
+            <a:r>
+              <a:rPr lang="en-US" dirty="0" smtClean="0"/>
+              <a:t>FTP</a:t>
+            </a:r>
+          </a:p>
+          <a:p>
+            <a:r>
+              <a:rPr lang="en-US" dirty="0" smtClean="0"/>
+              <a:t>Visual Studio Publish</a:t>
+            </a:r>
+          </a:p>
+          <a:p>
+            <a:r>
+              <a:rPr lang="en-US" dirty="0" smtClean="0"/>
+              <a:t>Publish from source control</a:t>
             </a:r>
             <a:endParaRPr lang="en-US" dirty="0"/>
           </a:p>
@@ -15704,20 +15706,13 @@
     </p:spTree>
     <p:extLst>
       <p:ext uri="{BB962C8B-B14F-4D97-AF65-F5344CB8AC3E}">
-        <p14:creationId xmlns:p14="http://schemas.microsoft.com/office/powerpoint/2010/main" val="393125443"/>
+        <p14:creationId xmlns:p14="http://schemas.microsoft.com/office/powerpoint/2010/main" val="3990459802"/>
       </p:ext>
     </p:extLst>
   </p:cSld>
   <p:clrMapOvr>
     <a:masterClrMapping/>
   </p:clrMapOvr>
-  <p:timing>
-    <p:tnLst>
-      <p:par>
-        <p:cTn id="1" dur="indefinite" restart="never" nodeType="tmRoot"/>
-      </p:par>
-    </p:tnLst>
-  </p:timing>
 </p:sld>
 </file>
 
@@ -15738,10 +15733,77 @@
           <a:chExt cx="0" cy="0"/>
         </a:xfrm>
       </p:grpSpPr>
+      <p:sp>
+        <p:nvSpPr>
+          <p:cNvPr id="2" name="Title 1"/>
+          <p:cNvSpPr>
+            <a:spLocks noGrp="1"/>
+          </p:cNvSpPr>
+          <p:nvPr>
+            <p:ph type="title"/>
+          </p:nvPr>
+        </p:nvSpPr>
+        <p:spPr/>
+        <p:txBody>
+          <a:bodyPr/>
+          <a:lstStyle/>
+          <a:p>
+            <a:r>
+              <a:rPr lang="en-US" dirty="0" smtClean="0"/>
+              <a:t>Resources</a:t>
+            </a:r>
+            <a:endParaRPr lang="en-US" dirty="0"/>
+          </a:p>
+        </p:txBody>
+      </p:sp>
+      <p:sp>
+        <p:nvSpPr>
+          <p:cNvPr id="3" name="Content Placeholder 2"/>
+          <p:cNvSpPr>
+            <a:spLocks noGrp="1"/>
+          </p:cNvSpPr>
+          <p:nvPr>
+            <p:ph sz="quarter" idx="10"/>
+          </p:nvPr>
+        </p:nvSpPr>
+        <p:spPr/>
+        <p:txBody>
+          <a:bodyPr/>
+          <a:lstStyle/>
+          <a:p>
+            <a:r>
+              <a:rPr lang="en-US" dirty="0" smtClean="0"/>
+              <a:t>aka.ms/</a:t>
+            </a:r>
+            <a:r>
+              <a:rPr lang="en-US" dirty="0" err="1" smtClean="0"/>
+              <a:t>mdha</a:t>
+            </a:r>
+            <a:endParaRPr lang="en-US" dirty="0" smtClean="0"/>
+          </a:p>
+          <a:p>
+            <a:r>
+              <a:rPr lang="en-US" dirty="0" smtClean="0"/>
+              <a:t>aka.ms/kudu</a:t>
+            </a:r>
+          </a:p>
+          <a:p>
+            <a:r>
+              <a:rPr lang="en-US" dirty="0" smtClean="0"/>
+              <a:t>aka.ms/</a:t>
+            </a:r>
+            <a:r>
+              <a:rPr lang="en-US" dirty="0" err="1" smtClean="0"/>
+              <a:t>azurewebsites</a:t>
+            </a:r>
+            <a:endParaRPr lang="en-US" dirty="0"/>
+          </a:p>
+        </p:txBody>
+      </p:sp>
     </p:spTree>
     <p:extLst>
       <p:ext uri="{BB962C8B-B14F-4D97-AF65-F5344CB8AC3E}">
-        <p14:creationId xmlns:p14="http://schemas.microsoft.com/office/powerpoint/2010/main" val="898363405"/>
+        <p14:creationId xmlns:p14="http://schemas.microsoft.com/office/powerpoint/2010/main" val="2537826810"/>
       </p:ext>
     </p:extLst>
   </p:cSld>
@@ -16142,6 +16204,127 @@
 </p:sld>
 </file>
 
+<file path=ppt/slides/slide20.xml><?xml version="1.0" encoding="utf-8"?>
+<p:sld xmlns:a="http://schemas.openxmlformats.org/drawingml/2006/main" xmlns:r="http://schemas.openxmlformats.org/officeDocument/2006/relationships" xmlns:p="http://schemas.openxmlformats.org/presentationml/2006/main">
+  <p:cSld>
+    <p:spTree>
+      <p:nvGrpSpPr>
+        <p:cNvPr id="1" name=""/>
+        <p:cNvGrpSpPr/>
+        <p:nvPr/>
+      </p:nvGrpSpPr>
+      <p:grpSpPr>
+        <a:xfrm>
+          <a:off x="0" y="0"/>
+          <a:ext cx="0" cy="0"/>
+          <a:chOff x="0" y="0"/>
+          <a:chExt cx="0" cy="0"/>
+        </a:xfrm>
+      </p:grpSpPr>
+      <p:sp>
+        <p:nvSpPr>
+          <p:cNvPr id="7" name="Content Placeholder 6"/>
+          <p:cNvSpPr>
+            <a:spLocks noGrp="1"/>
+          </p:cNvSpPr>
+          <p:nvPr>
+            <p:ph sz="quarter" idx="10"/>
+          </p:nvPr>
+        </p:nvSpPr>
+        <p:spPr/>
+        <p:txBody>
+          <a:bodyPr>
+            <a:normAutofit/>
+          </a:bodyPr>
+          <a:lstStyle/>
+          <a:p>
+            <a:r>
+              <a:rPr lang="en-GB" dirty="0" smtClean="0"/>
+              <a:t>Multi-device hybrid apps tooling</a:t>
+            </a:r>
+          </a:p>
+          <a:p>
+            <a:r>
+              <a:rPr lang="en-GB" dirty="0" smtClean="0"/>
+              <a:t>Deploying to Azure</a:t>
+            </a:r>
+            <a:endParaRPr lang="en-GB" dirty="0"/>
+          </a:p>
+        </p:txBody>
+      </p:sp>
+      <p:sp>
+        <p:nvSpPr>
+          <p:cNvPr id="2" name="Title 1"/>
+          <p:cNvSpPr>
+            <a:spLocks noGrp="1"/>
+          </p:cNvSpPr>
+          <p:nvPr>
+            <p:ph type="title"/>
+          </p:nvPr>
+        </p:nvSpPr>
+        <p:spPr/>
+        <p:txBody>
+          <a:bodyPr/>
+          <a:lstStyle/>
+          <a:p>
+            <a:r>
+              <a:rPr lang="en-US" dirty="0" smtClean="0"/>
+              <a:t>Summary</a:t>
+            </a:r>
+            <a:endParaRPr lang="en-US" dirty="0"/>
+          </a:p>
+        </p:txBody>
+      </p:sp>
+    </p:spTree>
+    <p:extLst>
+      <p:ext uri="{BB962C8B-B14F-4D97-AF65-F5344CB8AC3E}">
+        <p14:creationId xmlns:p14="http://schemas.microsoft.com/office/powerpoint/2010/main" val="393125443"/>
+      </p:ext>
+    </p:extLst>
+  </p:cSld>
+  <p:clrMapOvr>
+    <a:masterClrMapping/>
+  </p:clrMapOvr>
+  <p:timing>
+    <p:tnLst>
+      <p:par>
+        <p:cTn id="1" dur="indefinite" restart="never" nodeType="tmRoot"/>
+      </p:par>
+    </p:tnLst>
+  </p:timing>
+</p:sld>
+</file>
+
+<file path=ppt/slides/slide21.xml><?xml version="1.0" encoding="utf-8"?>
+<p:sld xmlns:a="http://schemas.openxmlformats.org/drawingml/2006/main" xmlns:r="http://schemas.openxmlformats.org/officeDocument/2006/relationships" xmlns:p="http://schemas.openxmlformats.org/presentationml/2006/main">
+  <p:cSld>
+    <p:spTree>
+      <p:nvGrpSpPr>
+        <p:cNvPr id="1" name=""/>
+        <p:cNvGrpSpPr/>
+        <p:nvPr/>
+      </p:nvGrpSpPr>
+      <p:grpSpPr>
+        <a:xfrm>
+          <a:off x="0" y="0"/>
+          <a:ext cx="0" cy="0"/>
+          <a:chOff x="0" y="0"/>
+          <a:chExt cx="0" cy="0"/>
+        </a:xfrm>
+      </p:grpSpPr>
+    </p:spTree>
+    <p:extLst>
+      <p:ext uri="{BB962C8B-B14F-4D97-AF65-F5344CB8AC3E}">
+        <p14:creationId xmlns:p14="http://schemas.microsoft.com/office/powerpoint/2010/main" val="898363405"/>
+      </p:ext>
+    </p:extLst>
+  </p:cSld>
+  <p:clrMapOvr>
+    <a:masterClrMapping/>
+  </p:clrMapOvr>
+</p:sld>
+</file>
+
 <file path=ppt/slides/slide3.xml><?xml version="1.0" encoding="utf-8"?>
 <p:sld xmlns:a="http://schemas.openxmlformats.org/drawingml/2006/main" xmlns:r="http://schemas.openxmlformats.org/officeDocument/2006/relationships" xmlns:p="http://schemas.openxmlformats.org/presentationml/2006/main">
   <p:cSld>
@@ -16291,13 +16474,8 @@
           <a:p>
             <a:r>
               <a:rPr lang="en-GB" dirty="0" smtClean="0"/>
-              <a:t>Multi-Device Hybrid Apps </a:t>
-            </a:r>
-            <a:r>
-              <a:rPr lang="en-GB" dirty="0" smtClean="0"/>
-              <a:t>Tooling</a:t>
-            </a:r>
-            <a:endParaRPr lang="en-GB" dirty="0" smtClean="0"/>
+              <a:t>Multi-Device Hybrid Apps Tooling</a:t>
+            </a:r>
           </a:p>
           <a:p>
             <a:r>

</xml_diff>